<commit_message>
chore: clean up artifacts, update .gitignore, add new source files
- Add .gitignore rules for pitch deck exports (pdf/pptx/mp4/docx),
  templates.zip, root-level logo source PNGs, and scripts/_slide_images/
- Remove tracked S Dark.png / S White.png (replaced by public/logo-*.png)
- Add functions/_lib/request-guards.js
- Add src/pages/Admin.tsx, src/utils/textNormalize.ts
- Add public/logo-*-header-*.png variants
- Add utility scripts (convert, gen_favicon, generate_video, reduce_pptx)
- Update functions, src components, and public assets
</commit_message>
<xml_diff>
--- a/SustainabilitySignals.pptx
+++ b/SustainabilitySignals.pptx
@@ -313,7 +313,7 @@
           <a:p>
             <a:fld id="{5BCAD085-E8A6-8845-BD4E-CB4CCA059FC4}" type="datetimeFigureOut">
               <a:rPr lang="en-US" smtClean="0"/>
-              <a:t>2/15/2026</a:t>
+              <a:t>2/18/2026</a:t>
             </a:fld>
             <a:endParaRPr lang="en-US"/>
           </a:p>
@@ -481,7 +481,7 @@
           <a:p>
             <a:fld id="{5BCAD085-E8A6-8845-BD4E-CB4CCA059FC4}" type="datetimeFigureOut">
               <a:rPr lang="en-US" smtClean="0"/>
-              <a:t>2/15/2026</a:t>
+              <a:t>2/18/2026</a:t>
             </a:fld>
             <a:endParaRPr lang="en-US"/>
           </a:p>
@@ -659,7 +659,7 @@
           <a:p>
             <a:fld id="{5BCAD085-E8A6-8845-BD4E-CB4CCA059FC4}" type="datetimeFigureOut">
               <a:rPr lang="en-US" smtClean="0"/>
-              <a:t>2/15/2026</a:t>
+              <a:t>2/18/2026</a:t>
             </a:fld>
             <a:endParaRPr lang="en-US"/>
           </a:p>
@@ -827,7 +827,7 @@
           <a:p>
             <a:fld id="{5BCAD085-E8A6-8845-BD4E-CB4CCA059FC4}" type="datetimeFigureOut">
               <a:rPr lang="en-US" smtClean="0"/>
-              <a:t>2/15/2026</a:t>
+              <a:t>2/18/2026</a:t>
             </a:fld>
             <a:endParaRPr lang="en-US"/>
           </a:p>
@@ -1072,7 +1072,7 @@
           <a:p>
             <a:fld id="{5BCAD085-E8A6-8845-BD4E-CB4CCA059FC4}" type="datetimeFigureOut">
               <a:rPr lang="en-US" smtClean="0"/>
-              <a:t>2/15/2026</a:t>
+              <a:t>2/18/2026</a:t>
             </a:fld>
             <a:endParaRPr lang="en-US"/>
           </a:p>
@@ -1357,7 +1357,7 @@
           <a:p>
             <a:fld id="{5BCAD085-E8A6-8845-BD4E-CB4CCA059FC4}" type="datetimeFigureOut">
               <a:rPr lang="en-US" smtClean="0"/>
-              <a:t>2/15/2026</a:t>
+              <a:t>2/18/2026</a:t>
             </a:fld>
             <a:endParaRPr lang="en-US"/>
           </a:p>
@@ -1776,7 +1776,7 @@
           <a:p>
             <a:fld id="{5BCAD085-E8A6-8845-BD4E-CB4CCA059FC4}" type="datetimeFigureOut">
               <a:rPr lang="en-US" smtClean="0"/>
-              <a:t>2/15/2026</a:t>
+              <a:t>2/18/2026</a:t>
             </a:fld>
             <a:endParaRPr lang="en-US"/>
           </a:p>
@@ -1893,7 +1893,7 @@
           <a:p>
             <a:fld id="{5BCAD085-E8A6-8845-BD4E-CB4CCA059FC4}" type="datetimeFigureOut">
               <a:rPr lang="en-US" smtClean="0"/>
-              <a:t>2/15/2026</a:t>
+              <a:t>2/18/2026</a:t>
             </a:fld>
             <a:endParaRPr lang="en-US"/>
           </a:p>
@@ -1988,7 +1988,7 @@
           <a:p>
             <a:fld id="{5BCAD085-E8A6-8845-BD4E-CB4CCA059FC4}" type="datetimeFigureOut">
               <a:rPr lang="en-US" smtClean="0"/>
-              <a:t>2/15/2026</a:t>
+              <a:t>2/18/2026</a:t>
             </a:fld>
             <a:endParaRPr lang="en-US"/>
           </a:p>
@@ -2263,7 +2263,7 @@
           <a:p>
             <a:fld id="{5BCAD085-E8A6-8845-BD4E-CB4CCA059FC4}" type="datetimeFigureOut">
               <a:rPr lang="en-US" smtClean="0"/>
-              <a:t>2/15/2026</a:t>
+              <a:t>2/18/2026</a:t>
             </a:fld>
             <a:endParaRPr lang="en-US"/>
           </a:p>
@@ -2515,7 +2515,7 @@
           <a:p>
             <a:fld id="{5BCAD085-E8A6-8845-BD4E-CB4CCA059FC4}" type="datetimeFigureOut">
               <a:rPr lang="en-US" smtClean="0"/>
-              <a:t>2/15/2026</a:t>
+              <a:t>2/18/2026</a:t>
             </a:fld>
             <a:endParaRPr lang="en-US"/>
           </a:p>
@@ -2726,7 +2726,7 @@
           <a:p>
             <a:fld id="{5BCAD085-E8A6-8845-BD4E-CB4CCA059FC4}" type="datetimeFigureOut">
               <a:rPr lang="en-US" smtClean="0"/>
-              <a:t>2/15/2026</a:t>
+              <a:t>2/18/2026</a:t>
             </a:fld>
             <a:endParaRPr lang="en-US"/>
           </a:p>
@@ -3303,61 +3303,6 @@
       </p:sp>
       <p:sp>
         <p:nvSpPr>
-          <p:cNvPr id="7" name="Rounded Rectangle 6"/>
-          <p:cNvSpPr/>
-          <p:nvPr/>
-        </p:nvSpPr>
-        <p:spPr>
-          <a:xfrm>
-            <a:off x="8686800" y="5321808"/>
-            <a:ext cx="1645920" cy="320040"/>
-          </a:xfrm>
-          <a:prstGeom prst="roundRect">
-            <a:avLst>
-              <a:gd name="adj" fmla="val 50000"/>
-            </a:avLst>
-          </a:prstGeom>
-          <a:solidFill>
-            <a:srgbClr val="16213A"/>
-          </a:solidFill>
-          <a:ln>
-            <a:noFill/>
-          </a:ln>
-        </p:spPr>
-        <p:style>
-          <a:lnRef idx="1">
-            <a:schemeClr val="accent1"/>
-          </a:lnRef>
-          <a:fillRef idx="3">
-            <a:schemeClr val="accent1"/>
-          </a:fillRef>
-          <a:effectRef idx="2">
-            <a:schemeClr val="accent1"/>
-          </a:effectRef>
-          <a:fontRef idx="minor">
-            <a:schemeClr val="lt1"/>
-          </a:fontRef>
-        </p:style>
-        <p:txBody>
-          <a:bodyPr wrap="none" rtlCol="0" anchor="ctr"/>
-          <a:lstStyle/>
-          <a:p>
-            <a:pPr algn="ctr">
-              <a:defRPr sz="1100" b="1">
-                <a:solidFill>
-                  <a:srgbClr val="34D399"/>
-                </a:solidFill>
-                <a:latin typeface="Calibri"/>
-              </a:defRPr>
-            </a:pPr>
-            <a:r>
-              <a:t>Student Project</a:t>
-            </a:r>
-          </a:p>
-        </p:txBody>
-      </p:sp>
-      <p:sp>
-        <p:nvSpPr>
           <p:cNvPr id="8" name="TextBox 7"/>
           <p:cNvSpPr txBox="1"/>
           <p:nvPr/>
@@ -5603,7 +5548,7 @@
         <p:spPr>
           <a:xfrm>
             <a:off x="1371600" y="3657600"/>
-            <a:ext cx="4389120" cy="320040"/>
+            <a:ext cx="4389120" cy="276999"/>
           </a:xfrm>
           <a:prstGeom prst="rect">
             <a:avLst/>
@@ -5626,15 +5571,7 @@
             </a:pPr>
             <a:r>
               <a:rPr dirty="0"/>
-              <a:t>🎓  Dual Degree: Master in Finance (AMS) + MBA Financial Services (</a:t>
-            </a:r>
-            <a:r>
-              <a:rPr dirty="0" err="1"/>
-              <a:t>Woxsen</a:t>
-            </a:r>
-            <a:r>
-              <a:rPr dirty="0"/>
-              <a:t>)</a:t>
+              <a:t>🎓  Dual Degree: Master in Finance (AMS) + MBA Financial Services </a:t>
             </a:r>
           </a:p>
         </p:txBody>
@@ -8539,8 +8476,8 @@
         </p:nvSpPr>
         <p:spPr>
           <a:xfrm>
-            <a:off x="1874520" y="3858768"/>
-            <a:ext cx="1371600" cy="320040"/>
+            <a:off x="1810512" y="3858768"/>
+            <a:ext cx="1527048" cy="353943"/>
           </a:xfrm>
           <a:prstGeom prst="rect">
             <a:avLst/>
@@ -8562,6 +8499,7 @@
               </a:defRPr>
             </a:pPr>
             <a:r>
+              <a:rPr dirty="0"/>
               <a:t>Completeness</a:t>
             </a:r>
           </a:p>

</xml_diff>